<commit_message>
fianlly done with the code(probably not)
</commit_message>
<xml_diff>
--- a/zadanie_01/lists_imp/dojebanaprezentacjaolistachidlaczegomojaimplementacjajestlepszaastdssiepale.pptx
+++ b/zadanie_01/lists_imp/dojebanaprezentacjaolistachidlaczegomojaimplementacjajestlepszaastdssiepale.pptx
@@ -6,6 +6,8 @@
   </p:sldMasterIdLst>
   <p:sldIdLst>
     <p:sldId id="256" r:id="rId5"/>
+    <p:sldId id="258" r:id="rId6"/>
+    <p:sldId id="257" r:id="rId7"/>
   </p:sldIdLst>
   <p:sldSz cx="12192000" cy="6858000"/>
   <p:notesSz cx="6858000" cy="9144000"/>
@@ -3360,10 +3362,16 @@
         </p:nvSpPr>
         <p:spPr/>
         <p:txBody>
-          <a:bodyPr/>
-          <a:lstStyle/>
-          <a:p>
-            <a:endParaRPr lang="en-GB"/>
+          <a:bodyPr>
+            <a:normAutofit fontScale="90000"/>
+          </a:bodyPr>
+          <a:lstStyle/>
+          <a:p>
+            <a:r>
+              <a:rPr lang="pl-PL" dirty="0"/>
+              <a:t>Praktyczna implementacja list jedno i dwukierunkowych oraz cyklicznych.</a:t>
+            </a:r>
+            <a:endParaRPr lang="en-GB" dirty="0"/>
           </a:p>
         </p:txBody>
       </p:sp>
@@ -3396,6 +3404,262 @@
     <p:extLst>
       <p:ext uri="{BB962C8B-B14F-4D97-AF65-F5344CB8AC3E}">
         <p14:creationId xmlns:p14="http://schemas.microsoft.com/office/powerpoint/2010/main" val="1667013846"/>
+      </p:ext>
+    </p:extLst>
+  </p:cSld>
+  <p:clrMapOvr>
+    <a:masterClrMapping/>
+  </p:clrMapOvr>
+</p:sld>
+</file>
+
+<file path=ppt/slides/slide2.xml><?xml version="1.0" encoding="utf-8"?>
+<p:sld xmlns:a="http://schemas.openxmlformats.org/drawingml/2006/main" xmlns:r="http://schemas.openxmlformats.org/officeDocument/2006/relationships" xmlns:p="http://schemas.openxmlformats.org/presentationml/2006/main">
+  <p:cSld>
+    <p:spTree>
+      <p:nvGrpSpPr>
+        <p:cNvPr id="1" name=""/>
+        <p:cNvGrpSpPr/>
+        <p:nvPr/>
+      </p:nvGrpSpPr>
+      <p:grpSpPr>
+        <a:xfrm>
+          <a:off x="0" y="0"/>
+          <a:ext cx="0" cy="0"/>
+          <a:chOff x="0" y="0"/>
+          <a:chExt cx="0" cy="0"/>
+        </a:xfrm>
+      </p:grpSpPr>
+      <p:sp>
+        <p:nvSpPr>
+          <p:cNvPr id="2" name="Title 1">
+            <a:extLst>
+              <a:ext uri="{FF2B5EF4-FFF2-40B4-BE49-F238E27FC236}">
+                <a16:creationId xmlns:a16="http://schemas.microsoft.com/office/drawing/2014/main" id="{ED4BDC36-2049-6EA8-8F7E-A5BA91DCC88B}"/>
+              </a:ext>
+            </a:extLst>
+          </p:cNvPr>
+          <p:cNvSpPr>
+            <a:spLocks noGrp="1"/>
+          </p:cNvSpPr>
+          <p:nvPr>
+            <p:ph type="title"/>
+          </p:nvPr>
+        </p:nvSpPr>
+        <p:spPr/>
+        <p:txBody>
+          <a:bodyPr/>
+          <a:lstStyle/>
+          <a:p>
+            <a:endParaRPr lang="en-GB" dirty="0"/>
+          </a:p>
+        </p:txBody>
+      </p:sp>
+      <p:sp>
+        <p:nvSpPr>
+          <p:cNvPr id="3" name="Content Placeholder 2">
+            <a:extLst>
+              <a:ext uri="{FF2B5EF4-FFF2-40B4-BE49-F238E27FC236}">
+                <a16:creationId xmlns:a16="http://schemas.microsoft.com/office/drawing/2014/main" id="{B041833D-9EF0-4D9F-31A9-13993F40636B}"/>
+              </a:ext>
+            </a:extLst>
+          </p:cNvPr>
+          <p:cNvSpPr>
+            <a:spLocks noGrp="1"/>
+          </p:cNvSpPr>
+          <p:nvPr>
+            <p:ph idx="1"/>
+          </p:nvPr>
+        </p:nvSpPr>
+        <p:spPr/>
+        <p:txBody>
+          <a:bodyPr/>
+          <a:lstStyle/>
+          <a:p>
+            <a:endParaRPr lang="en-GB"/>
+          </a:p>
+        </p:txBody>
+      </p:sp>
+    </p:spTree>
+    <p:extLst>
+      <p:ext uri="{BB962C8B-B14F-4D97-AF65-F5344CB8AC3E}">
+        <p14:creationId xmlns:p14="http://schemas.microsoft.com/office/powerpoint/2010/main" val="545156900"/>
+      </p:ext>
+    </p:extLst>
+  </p:cSld>
+  <p:clrMapOvr>
+    <a:masterClrMapping/>
+  </p:clrMapOvr>
+</p:sld>
+</file>
+
+<file path=ppt/slides/slide3.xml><?xml version="1.0" encoding="utf-8"?>
+<p:sld xmlns:a="http://schemas.openxmlformats.org/drawingml/2006/main" xmlns:r="http://schemas.openxmlformats.org/officeDocument/2006/relationships" xmlns:p="http://schemas.openxmlformats.org/presentationml/2006/main">
+  <p:cSld>
+    <p:bg>
+      <p:bgPr>
+        <a:blipFill dpi="0" rotWithShape="1">
+          <a:blip r:embed="rId2">
+            <a:lum/>
+          </a:blip>
+          <a:srcRect/>
+          <a:stretch>
+            <a:fillRect l="-4000" r="-4000"/>
+          </a:stretch>
+        </a:blipFill>
+        <a:effectLst/>
+      </p:bgPr>
+    </p:bg>
+    <p:spTree>
+      <p:nvGrpSpPr>
+        <p:cNvPr id="1" name=""/>
+        <p:cNvGrpSpPr/>
+        <p:nvPr/>
+      </p:nvGrpSpPr>
+      <p:grpSpPr>
+        <a:xfrm>
+          <a:off x="0" y="0"/>
+          <a:ext cx="0" cy="0"/>
+          <a:chOff x="0" y="0"/>
+          <a:chExt cx="0" cy="0"/>
+        </a:xfrm>
+      </p:grpSpPr>
+      <p:sp>
+        <p:nvSpPr>
+          <p:cNvPr id="2" name="Title 1">
+            <a:extLst>
+              <a:ext uri="{FF2B5EF4-FFF2-40B4-BE49-F238E27FC236}">
+                <a16:creationId xmlns:a16="http://schemas.microsoft.com/office/drawing/2014/main" id="{49A0659D-2076-0916-C7B6-E84B6101C65E}"/>
+              </a:ext>
+            </a:extLst>
+          </p:cNvPr>
+          <p:cNvSpPr>
+            <a:spLocks noGrp="1"/>
+          </p:cNvSpPr>
+          <p:nvPr>
+            <p:ph type="title"/>
+          </p:nvPr>
+        </p:nvSpPr>
+        <p:spPr/>
+        <p:txBody>
+          <a:bodyPr/>
+          <a:lstStyle/>
+          <a:p>
+            <a:r>
+              <a:rPr lang="pl-PL" dirty="0">
+                <a:solidFill>
+                  <a:schemeClr val="bg1"/>
+                </a:solidFill>
+              </a:rPr>
+              <a:t>Wnioski	</a:t>
+            </a:r>
+            <a:endParaRPr lang="en-GB" dirty="0">
+              <a:solidFill>
+                <a:schemeClr val="bg1"/>
+              </a:solidFill>
+            </a:endParaRPr>
+          </a:p>
+        </p:txBody>
+      </p:sp>
+      <p:sp>
+        <p:nvSpPr>
+          <p:cNvPr id="3" name="Content Placeholder 2">
+            <a:extLst>
+              <a:ext uri="{FF2B5EF4-FFF2-40B4-BE49-F238E27FC236}">
+                <a16:creationId xmlns:a16="http://schemas.microsoft.com/office/drawing/2014/main" id="{9F367ABE-FE43-FE9C-2782-DCB81EDFAF2E}"/>
+              </a:ext>
+            </a:extLst>
+          </p:cNvPr>
+          <p:cNvSpPr>
+            <a:spLocks noGrp="1"/>
+          </p:cNvSpPr>
+          <p:nvPr>
+            <p:ph idx="1"/>
+          </p:nvPr>
+        </p:nvSpPr>
+        <p:spPr/>
+        <p:txBody>
+          <a:bodyPr/>
+          <a:lstStyle/>
+          <a:p>
+            <a:r>
+              <a:rPr lang="pl-PL" dirty="0">
+                <a:solidFill>
+                  <a:schemeClr val="bg1"/>
+                </a:solidFill>
+              </a:rPr>
+              <a:t>Scope creep to szmata i trzeba na to uważać</a:t>
+            </a:r>
+          </a:p>
+          <a:p>
+            <a:r>
+              <a:rPr lang="en-GB" dirty="0">
+                <a:solidFill>
+                  <a:schemeClr val="bg1"/>
+                </a:solidFill>
+              </a:rPr>
+              <a:t>AI </a:t>
+            </a:r>
+            <a:r>
+              <a:rPr lang="en-GB" dirty="0" err="1">
+                <a:solidFill>
+                  <a:schemeClr val="bg1"/>
+                </a:solidFill>
+              </a:rPr>
+              <a:t>nie</a:t>
+            </a:r>
+            <a:r>
+              <a:rPr lang="en-GB" dirty="0">
+                <a:solidFill>
+                  <a:schemeClr val="bg1"/>
+                </a:solidFill>
+              </a:rPr>
+              <a:t> jest </a:t>
+            </a:r>
+            <a:r>
+              <a:rPr lang="en-GB" dirty="0" err="1">
+                <a:solidFill>
+                  <a:schemeClr val="bg1"/>
+                </a:solidFill>
+              </a:rPr>
+              <a:t>dobre</a:t>
+            </a:r>
+            <a:r>
+              <a:rPr lang="en-GB" dirty="0">
+                <a:solidFill>
+                  <a:schemeClr val="bg1"/>
+                </a:solidFill>
+              </a:rPr>
+              <a:t> w </a:t>
+            </a:r>
+            <a:r>
+              <a:rPr lang="en-GB" dirty="0" err="1">
+                <a:solidFill>
+                  <a:schemeClr val="bg1"/>
+                </a:solidFill>
+              </a:rPr>
+              <a:t>wymy</a:t>
+            </a:r>
+            <a:r>
+              <a:rPr lang="pl-PL">
+                <a:solidFill>
+                  <a:schemeClr val="bg1"/>
+                </a:solidFill>
+              </a:rPr>
+              <a:t>ślaniu nowych rozwiązań</a:t>
+            </a:r>
+            <a:endParaRPr lang="en-GB" dirty="0">
+              <a:solidFill>
+                <a:schemeClr val="bg1"/>
+              </a:solidFill>
+            </a:endParaRPr>
+          </a:p>
+        </p:txBody>
+      </p:sp>
+    </p:spTree>
+    <p:extLst>
+      <p:ext uri="{BB962C8B-B14F-4D97-AF65-F5344CB8AC3E}">
+        <p14:creationId xmlns:p14="http://schemas.microsoft.com/office/powerpoint/2010/main" val="3880871455"/>
       </p:ext>
     </p:extLst>
   </p:cSld>

</xml_diff>